<commit_message>
add oop training and ppt
</commit_message>
<xml_diff>
--- a/docs/concepts.pptx
+++ b/docs/concepts.pptx
@@ -7,8 +7,8 @@
   <p:sldIdLst>
     <p:sldId id="265" r:id="rId2"/>
     <p:sldId id="256" r:id="rId3"/>
-    <p:sldId id="266" r:id="rId4"/>
-    <p:sldId id="267" r:id="rId5"/>
+    <p:sldId id="267" r:id="rId4"/>
+    <p:sldId id="266" r:id="rId5"/>
     <p:sldId id="268" r:id="rId6"/>
     <p:sldId id="257" r:id="rId7"/>
     <p:sldId id="258" r:id="rId8"/>
@@ -116,6 +116,11 @@
       </a:defRPr>
     </a:lvl9pPr>
   </p:defaultTextStyle>
+  <p:extLst>
+    <p:ext uri="{EFAFB233-063F-42B5-8137-9DF3F51BA10A}">
+      <p15:sldGuideLst xmlns:p15="http://schemas.microsoft.com/office/powerpoint/2012/main"/>
+    </p:ext>
+  </p:extLst>
 </p:presentation>
 </file>
 
@@ -3515,6 +3520,50 @@
       </p:grpSpPr>
       <p:sp>
         <p:nvSpPr>
+          <p:cNvPr id="5" name="Rektangel 4">
+            <a:extLst>
+              <a:ext uri="{FF2B5EF4-FFF2-40B4-BE49-F238E27FC236}">
+                <a16:creationId xmlns:a16="http://schemas.microsoft.com/office/drawing/2014/main" id="{55EF5523-1B70-4CC6-9843-B5458C0CECF2}"/>
+              </a:ext>
+            </a:extLst>
+          </p:cNvPr>
+          <p:cNvSpPr/>
+          <p:nvPr/>
+        </p:nvSpPr>
+        <p:spPr>
+          <a:xfrm>
+            <a:off x="4878160" y="161947"/>
+            <a:ext cx="6217104" cy="3331028"/>
+          </a:xfrm>
+          <a:prstGeom prst="rect">
+            <a:avLst/>
+          </a:prstGeom>
+        </p:spPr>
+        <p:style>
+          <a:lnRef idx="2">
+            <a:schemeClr val="accent1"/>
+          </a:lnRef>
+          <a:fillRef idx="1">
+            <a:schemeClr val="lt1"/>
+          </a:fillRef>
+          <a:effectRef idx="0">
+            <a:schemeClr val="accent1"/>
+          </a:effectRef>
+          <a:fontRef idx="minor">
+            <a:schemeClr val="dk1"/>
+          </a:fontRef>
+        </p:style>
+        <p:txBody>
+          <a:bodyPr rtlCol="0" anchor="ctr"/>
+          <a:lstStyle/>
+          <a:p>
+            <a:pPr algn="ctr"/>
+            <a:endParaRPr lang="nb-NO" dirty="0"/>
+          </a:p>
+        </p:txBody>
+      </p:sp>
+      <p:sp>
+        <p:nvSpPr>
           <p:cNvPr id="4" name="TekstSylinder 3">
             <a:extLst>
               <a:ext uri="{FF2B5EF4-FFF2-40B4-BE49-F238E27FC236}">
@@ -3549,6 +3598,654 @@
           </a:p>
         </p:txBody>
       </p:sp>
+      <p:sp>
+        <p:nvSpPr>
+          <p:cNvPr id="3" name="TekstSylinder 2">
+            <a:extLst>
+              <a:ext uri="{FF2B5EF4-FFF2-40B4-BE49-F238E27FC236}">
+                <a16:creationId xmlns:a16="http://schemas.microsoft.com/office/drawing/2014/main" id="{52B885A7-AC73-44CF-8C65-4B667FFF9B84}"/>
+              </a:ext>
+            </a:extLst>
+          </p:cNvPr>
+          <p:cNvSpPr txBox="1"/>
+          <p:nvPr/>
+        </p:nvSpPr>
+        <p:spPr>
+          <a:xfrm>
+            <a:off x="138794" y="1694601"/>
+            <a:ext cx="4624178" cy="2308324"/>
+          </a:xfrm>
+          <a:prstGeom prst="rect">
+            <a:avLst/>
+          </a:prstGeom>
+          <a:noFill/>
+        </p:spPr>
+        <p:txBody>
+          <a:bodyPr wrap="square" rtlCol="0">
+            <a:spAutoFit/>
+          </a:bodyPr>
+          <a:lstStyle/>
+          <a:p>
+            <a:pPr marL="285750" indent="-285750">
+              <a:buFont typeface="Arial" panose="020B0604020202020204" pitchFamily="34" charset="0"/>
+              <a:buChar char="•"/>
+            </a:pPr>
+            <a:r>
+              <a:rPr lang="nb-NO" dirty="0" err="1"/>
+              <a:t>Namespace</a:t>
+            </a:r>
+            <a:endParaRPr lang="nb-NO" dirty="0"/>
+          </a:p>
+          <a:p>
+            <a:pPr marL="742950" lvl="1" indent="-285750">
+              <a:buFont typeface="Arial" panose="020B0604020202020204" pitchFamily="34" charset="0"/>
+              <a:buChar char="•"/>
+            </a:pPr>
+            <a:r>
+              <a:rPr lang="nb-NO" dirty="0"/>
+              <a:t>navnekollisjoner</a:t>
+            </a:r>
+          </a:p>
+          <a:p>
+            <a:pPr marL="742950" lvl="1" indent="-285750">
+              <a:buFont typeface="Arial" panose="020B0604020202020204" pitchFamily="34" charset="0"/>
+              <a:buChar char="•"/>
+            </a:pPr>
+            <a:r>
+              <a:rPr lang="nb-NO" dirty="0"/>
+              <a:t>bibliotek av klasser</a:t>
+            </a:r>
+          </a:p>
+          <a:p>
+            <a:pPr marL="285750" indent="-285750">
+              <a:buFont typeface="Arial" panose="020B0604020202020204" pitchFamily="34" charset="0"/>
+              <a:buChar char="•"/>
+            </a:pPr>
+            <a:r>
+              <a:rPr lang="nb-NO" dirty="0" err="1"/>
+              <a:t>Classes</a:t>
+            </a:r>
+            <a:r>
+              <a:rPr lang="nb-NO" dirty="0"/>
+              <a:t>, </a:t>
+            </a:r>
+            <a:r>
+              <a:rPr lang="nb-NO" dirty="0" err="1"/>
+              <a:t>methods</a:t>
+            </a:r>
+            <a:r>
+              <a:rPr lang="nb-NO" dirty="0"/>
+              <a:t>, </a:t>
+            </a:r>
+            <a:r>
+              <a:rPr lang="nb-NO" dirty="0" err="1"/>
+              <a:t>traits</a:t>
+            </a:r>
+            <a:r>
+              <a:rPr lang="nb-NO" dirty="0"/>
+              <a:t>,</a:t>
+            </a:r>
+          </a:p>
+          <a:p>
+            <a:pPr marL="285750" indent="-285750">
+              <a:buFont typeface="Arial" panose="020B0604020202020204" pitchFamily="34" charset="0"/>
+              <a:buChar char="•"/>
+            </a:pPr>
+            <a:r>
+              <a:rPr lang="nb-NO" dirty="0" err="1"/>
+              <a:t>Visibility</a:t>
+            </a:r>
+            <a:r>
+              <a:rPr lang="nb-NO" dirty="0"/>
+              <a:t> (</a:t>
+            </a:r>
+            <a:r>
+              <a:rPr lang="nb-NO" dirty="0" err="1"/>
+              <a:t>method,variable,property</a:t>
+            </a:r>
+            <a:r>
+              <a:rPr lang="nb-NO" dirty="0"/>
+              <a:t>)</a:t>
+            </a:r>
+          </a:p>
+          <a:p>
+            <a:pPr marL="742950" lvl="1" indent="-285750">
+              <a:buFont typeface="Arial" panose="020B0604020202020204" pitchFamily="34" charset="0"/>
+              <a:buChar char="•"/>
+            </a:pPr>
+            <a:r>
+              <a:rPr lang="nb-NO" dirty="0" err="1"/>
+              <a:t>public</a:t>
+            </a:r>
+            <a:endParaRPr lang="nb-NO" dirty="0"/>
+          </a:p>
+          <a:p>
+            <a:pPr marL="742950" lvl="1" indent="-285750">
+              <a:buFont typeface="Arial" panose="020B0604020202020204" pitchFamily="34" charset="0"/>
+              <a:buChar char="•"/>
+            </a:pPr>
+            <a:r>
+              <a:rPr lang="nb-NO" dirty="0" err="1"/>
+              <a:t>protected</a:t>
+            </a:r>
+            <a:endParaRPr lang="nb-NO" dirty="0"/>
+          </a:p>
+          <a:p>
+            <a:pPr marL="742950" lvl="1" indent="-285750">
+              <a:buFont typeface="Arial" panose="020B0604020202020204" pitchFamily="34" charset="0"/>
+              <a:buChar char="•"/>
+            </a:pPr>
+            <a:r>
+              <a:rPr lang="nb-NO" dirty="0"/>
+              <a:t>Private</a:t>
+            </a:r>
+          </a:p>
+        </p:txBody>
+      </p:sp>
+      <p:sp>
+        <p:nvSpPr>
+          <p:cNvPr id="2" name="Ellipse 1">
+            <a:extLst>
+              <a:ext uri="{FF2B5EF4-FFF2-40B4-BE49-F238E27FC236}">
+                <a16:creationId xmlns:a16="http://schemas.microsoft.com/office/drawing/2014/main" id="{FAC6AB5C-8F3B-4B03-A868-738D42ABB627}"/>
+              </a:ext>
+            </a:extLst>
+          </p:cNvPr>
+          <p:cNvSpPr/>
+          <p:nvPr/>
+        </p:nvSpPr>
+        <p:spPr>
+          <a:xfrm>
+            <a:off x="6033407" y="740574"/>
+            <a:ext cx="1098097" cy="1002501"/>
+          </a:xfrm>
+          <a:prstGeom prst="ellipse">
+            <a:avLst/>
+          </a:prstGeom>
+        </p:spPr>
+        <p:style>
+          <a:lnRef idx="0">
+            <a:schemeClr val="accent2"/>
+          </a:lnRef>
+          <a:fillRef idx="3">
+            <a:schemeClr val="accent2"/>
+          </a:fillRef>
+          <a:effectRef idx="3">
+            <a:schemeClr val="accent2"/>
+          </a:effectRef>
+          <a:fontRef idx="minor">
+            <a:schemeClr val="lt1"/>
+          </a:fontRef>
+        </p:style>
+        <p:txBody>
+          <a:bodyPr rtlCol="0" anchor="ctr"/>
+          <a:lstStyle/>
+          <a:p>
+            <a:pPr algn="ctr"/>
+            <a:r>
+              <a:rPr lang="nb-NO" sz="1100" dirty="0" err="1"/>
+              <a:t>Xblock</a:t>
+            </a:r>
+            <a:endParaRPr lang="nb-NO" sz="1100" dirty="0"/>
+          </a:p>
+          <a:p>
+            <a:pPr algn="ctr"/>
+            <a:r>
+              <a:rPr lang="nb-NO" sz="1100" dirty="0" err="1"/>
+              <a:t>protected</a:t>
+            </a:r>
+            <a:endParaRPr lang="nb-NO" sz="1100" dirty="0"/>
+          </a:p>
+        </p:txBody>
+      </p:sp>
+      <p:sp>
+        <p:nvSpPr>
+          <p:cNvPr id="7" name="TekstSylinder 6">
+            <a:extLst>
+              <a:ext uri="{FF2B5EF4-FFF2-40B4-BE49-F238E27FC236}">
+                <a16:creationId xmlns:a16="http://schemas.microsoft.com/office/drawing/2014/main" id="{1EDD53B0-C445-43F5-A3F4-C9E90FDD7FE5}"/>
+              </a:ext>
+            </a:extLst>
+          </p:cNvPr>
+          <p:cNvSpPr txBox="1"/>
+          <p:nvPr/>
+        </p:nvSpPr>
+        <p:spPr>
+          <a:xfrm>
+            <a:off x="5081247" y="231712"/>
+            <a:ext cx="2601346" cy="369332"/>
+          </a:xfrm>
+          <a:prstGeom prst="rect">
+            <a:avLst/>
+          </a:prstGeom>
+          <a:noFill/>
+        </p:spPr>
+        <p:txBody>
+          <a:bodyPr wrap="square">
+            <a:spAutoFit/>
+          </a:bodyPr>
+          <a:lstStyle/>
+          <a:p>
+            <a:r>
+              <a:rPr lang="nb-NO" dirty="0" err="1"/>
+              <a:t>Namespace</a:t>
+            </a:r>
+            <a:r>
+              <a:rPr lang="nb-NO" dirty="0"/>
+              <a:t>: him/</a:t>
+            </a:r>
+            <a:r>
+              <a:rPr lang="nb-NO" dirty="0" err="1"/>
+              <a:t>mvc</a:t>
+            </a:r>
+            <a:r>
+              <a:rPr lang="nb-NO" dirty="0"/>
+              <a:t>/</a:t>
+            </a:r>
+          </a:p>
+        </p:txBody>
+      </p:sp>
+      <p:sp>
+        <p:nvSpPr>
+          <p:cNvPr id="8" name="Ellipse 7">
+            <a:extLst>
+              <a:ext uri="{FF2B5EF4-FFF2-40B4-BE49-F238E27FC236}">
+                <a16:creationId xmlns:a16="http://schemas.microsoft.com/office/drawing/2014/main" id="{290FA146-BAA3-4C2E-8B9F-B29304B1EE9E}"/>
+              </a:ext>
+            </a:extLst>
+          </p:cNvPr>
+          <p:cNvSpPr/>
+          <p:nvPr/>
+        </p:nvSpPr>
+        <p:spPr>
+          <a:xfrm>
+            <a:off x="8401940" y="740573"/>
+            <a:ext cx="1098097" cy="1002501"/>
+          </a:xfrm>
+          <a:prstGeom prst="ellipse">
+            <a:avLst/>
+          </a:prstGeom>
+        </p:spPr>
+        <p:style>
+          <a:lnRef idx="2">
+            <a:schemeClr val="accent1">
+              <a:shade val="50000"/>
+            </a:schemeClr>
+          </a:lnRef>
+          <a:fillRef idx="1">
+            <a:schemeClr val="accent1"/>
+          </a:fillRef>
+          <a:effectRef idx="0">
+            <a:schemeClr val="accent1"/>
+          </a:effectRef>
+          <a:fontRef idx="minor">
+            <a:schemeClr val="lt1"/>
+          </a:fontRef>
+        </p:style>
+        <p:txBody>
+          <a:bodyPr rtlCol="0" anchor="ctr"/>
+          <a:lstStyle/>
+          <a:p>
+            <a:pPr algn="ctr"/>
+            <a:r>
+              <a:rPr lang="nb-NO" sz="1600" dirty="0"/>
+              <a:t>Library</a:t>
+            </a:r>
+          </a:p>
+          <a:p>
+            <a:pPr algn="ctr"/>
+            <a:r>
+              <a:rPr lang="nb-NO" sz="1600" dirty="0" err="1"/>
+              <a:t>public</a:t>
+            </a:r>
+            <a:endParaRPr lang="nb-NO" sz="1600" dirty="0"/>
+          </a:p>
+        </p:txBody>
+      </p:sp>
+      <p:sp>
+        <p:nvSpPr>
+          <p:cNvPr id="9" name="Rektangel 8">
+            <a:extLst>
+              <a:ext uri="{FF2B5EF4-FFF2-40B4-BE49-F238E27FC236}">
+                <a16:creationId xmlns:a16="http://schemas.microsoft.com/office/drawing/2014/main" id="{889E1DC2-AF71-4AD2-A85E-55578243E85E}"/>
+              </a:ext>
+            </a:extLst>
+          </p:cNvPr>
+          <p:cNvSpPr/>
+          <p:nvPr/>
+        </p:nvSpPr>
+        <p:spPr>
+          <a:xfrm>
+            <a:off x="4878160" y="3562740"/>
+            <a:ext cx="6217104" cy="3246274"/>
+          </a:xfrm>
+          <a:prstGeom prst="rect">
+            <a:avLst/>
+          </a:prstGeom>
+        </p:spPr>
+        <p:style>
+          <a:lnRef idx="2">
+            <a:schemeClr val="accent1"/>
+          </a:lnRef>
+          <a:fillRef idx="1">
+            <a:schemeClr val="lt1"/>
+          </a:fillRef>
+          <a:effectRef idx="0">
+            <a:schemeClr val="accent1"/>
+          </a:effectRef>
+          <a:fontRef idx="minor">
+            <a:schemeClr val="dk1"/>
+          </a:fontRef>
+        </p:style>
+        <p:txBody>
+          <a:bodyPr rtlCol="0" anchor="ctr"/>
+          <a:lstStyle/>
+          <a:p>
+            <a:pPr algn="ctr"/>
+            <a:endParaRPr lang="nb-NO" dirty="0"/>
+          </a:p>
+        </p:txBody>
+      </p:sp>
+      <p:sp>
+        <p:nvSpPr>
+          <p:cNvPr id="10" name="Ellipse 9">
+            <a:extLst>
+              <a:ext uri="{FF2B5EF4-FFF2-40B4-BE49-F238E27FC236}">
+                <a16:creationId xmlns:a16="http://schemas.microsoft.com/office/drawing/2014/main" id="{9C8B9614-6C96-4A4D-BC93-1FD65A5A9D66}"/>
+              </a:ext>
+            </a:extLst>
+          </p:cNvPr>
+          <p:cNvSpPr/>
+          <p:nvPr/>
+        </p:nvSpPr>
+        <p:spPr>
+          <a:xfrm>
+            <a:off x="6033407" y="4124184"/>
+            <a:ext cx="1098097" cy="1002501"/>
+          </a:xfrm>
+          <a:prstGeom prst="ellipse">
+            <a:avLst/>
+          </a:prstGeom>
+        </p:spPr>
+        <p:style>
+          <a:lnRef idx="2">
+            <a:schemeClr val="accent1">
+              <a:shade val="50000"/>
+            </a:schemeClr>
+          </a:lnRef>
+          <a:fillRef idx="1">
+            <a:schemeClr val="accent1"/>
+          </a:fillRef>
+          <a:effectRef idx="0">
+            <a:schemeClr val="accent1"/>
+          </a:effectRef>
+          <a:fontRef idx="minor">
+            <a:schemeClr val="lt1"/>
+          </a:fontRef>
+        </p:style>
+        <p:txBody>
+          <a:bodyPr rtlCol="0" anchor="ctr"/>
+          <a:lstStyle/>
+          <a:p>
+            <a:pPr algn="ctr"/>
+            <a:r>
+              <a:rPr lang="nb-NO" sz="1600" dirty="0" err="1"/>
+              <a:t>XBlock</a:t>
+            </a:r>
+            <a:endParaRPr lang="nb-NO" sz="1600" dirty="0"/>
+          </a:p>
+        </p:txBody>
+      </p:sp>
+      <p:sp>
+        <p:nvSpPr>
+          <p:cNvPr id="11" name="TekstSylinder 10">
+            <a:extLst>
+              <a:ext uri="{FF2B5EF4-FFF2-40B4-BE49-F238E27FC236}">
+                <a16:creationId xmlns:a16="http://schemas.microsoft.com/office/drawing/2014/main" id="{5D59F442-7B5E-4D97-A8D4-4520A63C74F9}"/>
+              </a:ext>
+            </a:extLst>
+          </p:cNvPr>
+          <p:cNvSpPr txBox="1"/>
+          <p:nvPr/>
+        </p:nvSpPr>
+        <p:spPr>
+          <a:xfrm>
+            <a:off x="5081247" y="3615322"/>
+            <a:ext cx="2601346" cy="369332"/>
+          </a:xfrm>
+          <a:prstGeom prst="rect">
+            <a:avLst/>
+          </a:prstGeom>
+          <a:noFill/>
+        </p:spPr>
+        <p:txBody>
+          <a:bodyPr wrap="square">
+            <a:spAutoFit/>
+          </a:bodyPr>
+          <a:lstStyle/>
+          <a:p>
+            <a:r>
+              <a:rPr lang="nb-NO" dirty="0" err="1"/>
+              <a:t>Namespace</a:t>
+            </a:r>
+            <a:r>
+              <a:rPr lang="nb-NO" dirty="0"/>
+              <a:t>: ntnu/</a:t>
+            </a:r>
+            <a:r>
+              <a:rPr lang="nb-NO" dirty="0" err="1"/>
+              <a:t>mvc</a:t>
+            </a:r>
+            <a:r>
+              <a:rPr lang="nb-NO" dirty="0"/>
+              <a:t>/</a:t>
+            </a:r>
+          </a:p>
+        </p:txBody>
+      </p:sp>
+      <p:sp>
+        <p:nvSpPr>
+          <p:cNvPr id="12" name="Ellipse 11">
+            <a:extLst>
+              <a:ext uri="{FF2B5EF4-FFF2-40B4-BE49-F238E27FC236}">
+                <a16:creationId xmlns:a16="http://schemas.microsoft.com/office/drawing/2014/main" id="{11A14C55-D763-46CF-A060-2BD926062A46}"/>
+              </a:ext>
+            </a:extLst>
+          </p:cNvPr>
+          <p:cNvSpPr/>
+          <p:nvPr/>
+        </p:nvSpPr>
+        <p:spPr>
+          <a:xfrm>
+            <a:off x="8401940" y="4124183"/>
+            <a:ext cx="1098097" cy="1002501"/>
+          </a:xfrm>
+          <a:prstGeom prst="ellipse">
+            <a:avLst/>
+          </a:prstGeom>
+        </p:spPr>
+        <p:style>
+          <a:lnRef idx="2">
+            <a:schemeClr val="accent1">
+              <a:shade val="50000"/>
+            </a:schemeClr>
+          </a:lnRef>
+          <a:fillRef idx="1">
+            <a:schemeClr val="accent1"/>
+          </a:fillRef>
+          <a:effectRef idx="0">
+            <a:schemeClr val="accent1"/>
+          </a:effectRef>
+          <a:fontRef idx="minor">
+            <a:schemeClr val="lt1"/>
+          </a:fontRef>
+        </p:style>
+        <p:txBody>
+          <a:bodyPr rtlCol="0" anchor="ctr"/>
+          <a:lstStyle/>
+          <a:p>
+            <a:pPr algn="ctr"/>
+            <a:r>
+              <a:rPr lang="nb-NO" sz="1600" dirty="0"/>
+              <a:t>Library</a:t>
+            </a:r>
+          </a:p>
+        </p:txBody>
+      </p:sp>
+      <p:sp>
+        <p:nvSpPr>
+          <p:cNvPr id="13" name="Ellipse 12">
+            <a:extLst>
+              <a:ext uri="{FF2B5EF4-FFF2-40B4-BE49-F238E27FC236}">
+                <a16:creationId xmlns:a16="http://schemas.microsoft.com/office/drawing/2014/main" id="{B116B4A5-D72D-4A47-AB6C-23EBE54EDE54}"/>
+              </a:ext>
+            </a:extLst>
+          </p:cNvPr>
+          <p:cNvSpPr/>
+          <p:nvPr/>
+        </p:nvSpPr>
+        <p:spPr>
+          <a:xfrm>
+            <a:off x="8753474" y="2235583"/>
+            <a:ext cx="1098097" cy="1002501"/>
+          </a:xfrm>
+          <a:prstGeom prst="ellipse">
+            <a:avLst/>
+          </a:prstGeom>
+        </p:spPr>
+        <p:style>
+          <a:lnRef idx="2">
+            <a:schemeClr val="accent6">
+              <a:shade val="50000"/>
+            </a:schemeClr>
+          </a:lnRef>
+          <a:fillRef idx="1">
+            <a:schemeClr val="accent6"/>
+          </a:fillRef>
+          <a:effectRef idx="0">
+            <a:schemeClr val="accent6"/>
+          </a:effectRef>
+          <a:fontRef idx="minor">
+            <a:schemeClr val="lt1"/>
+          </a:fontRef>
+        </p:style>
+        <p:txBody>
+          <a:bodyPr rtlCol="0" anchor="ctr"/>
+          <a:lstStyle/>
+          <a:p>
+            <a:pPr algn="ctr"/>
+            <a:r>
+              <a:rPr lang="nb-NO" sz="1400" dirty="0" err="1"/>
+              <a:t>InternalXBlock</a:t>
+            </a:r>
+            <a:endParaRPr lang="nb-NO" sz="1400" dirty="0"/>
+          </a:p>
+          <a:p>
+            <a:pPr algn="ctr"/>
+            <a:r>
+              <a:rPr lang="nb-NO" sz="1400" dirty="0"/>
+              <a:t>private</a:t>
+            </a:r>
+          </a:p>
+        </p:txBody>
+      </p:sp>
+      <p:sp>
+        <p:nvSpPr>
+          <p:cNvPr id="14" name="Ellipse 13">
+            <a:extLst>
+              <a:ext uri="{FF2B5EF4-FFF2-40B4-BE49-F238E27FC236}">
+                <a16:creationId xmlns:a16="http://schemas.microsoft.com/office/drawing/2014/main" id="{02AEB000-8252-440E-877B-EC8CCD63E2C2}"/>
+              </a:ext>
+            </a:extLst>
+          </p:cNvPr>
+          <p:cNvSpPr/>
+          <p:nvPr/>
+        </p:nvSpPr>
+        <p:spPr>
+          <a:xfrm>
+            <a:off x="6033407" y="2152753"/>
+            <a:ext cx="1098097" cy="1002501"/>
+          </a:xfrm>
+          <a:prstGeom prst="ellipse">
+            <a:avLst/>
+          </a:prstGeom>
+        </p:spPr>
+        <p:style>
+          <a:lnRef idx="0">
+            <a:schemeClr val="accent2"/>
+          </a:lnRef>
+          <a:fillRef idx="3">
+            <a:schemeClr val="accent2"/>
+          </a:fillRef>
+          <a:effectRef idx="3">
+            <a:schemeClr val="accent2"/>
+          </a:effectRef>
+          <a:fontRef idx="minor">
+            <a:schemeClr val="lt1"/>
+          </a:fontRef>
+        </p:style>
+        <p:txBody>
+          <a:bodyPr rtlCol="0" anchor="ctr"/>
+          <a:lstStyle/>
+          <a:p>
+            <a:pPr algn="ctr"/>
+            <a:r>
+              <a:rPr lang="nb-NO" sz="1100" dirty="0" err="1"/>
+              <a:t>GradeXblock</a:t>
+            </a:r>
+            <a:endParaRPr lang="nb-NO" sz="1100" dirty="0"/>
+          </a:p>
+          <a:p>
+            <a:pPr algn="ctr"/>
+            <a:r>
+              <a:rPr lang="nb-NO" sz="1100" dirty="0" err="1"/>
+              <a:t>protected</a:t>
+            </a:r>
+            <a:endParaRPr lang="nb-NO" sz="1100" dirty="0"/>
+          </a:p>
+        </p:txBody>
+      </p:sp>
+      <p:cxnSp>
+        <p:nvCxnSpPr>
+          <p:cNvPr id="16" name="Rett pilkobling 15">
+            <a:extLst>
+              <a:ext uri="{FF2B5EF4-FFF2-40B4-BE49-F238E27FC236}">
+                <a16:creationId xmlns:a16="http://schemas.microsoft.com/office/drawing/2014/main" id="{30CE14F3-B3A8-420B-985C-0B7EA2F910B5}"/>
+              </a:ext>
+            </a:extLst>
+          </p:cNvPr>
+          <p:cNvCxnSpPr>
+            <a:endCxn id="14" idx="0"/>
+          </p:cNvCxnSpPr>
+          <p:nvPr/>
+        </p:nvCxnSpPr>
+        <p:spPr>
+          <a:xfrm>
+            <a:off x="6582455" y="1743074"/>
+            <a:ext cx="1" cy="409679"/>
+          </a:xfrm>
+          <a:prstGeom prst="straightConnector1">
+            <a:avLst/>
+          </a:prstGeom>
+          <a:ln>
+            <a:tailEnd type="triangle"/>
+          </a:ln>
+        </p:spPr>
+        <p:style>
+          <a:lnRef idx="1">
+            <a:schemeClr val="accent1"/>
+          </a:lnRef>
+          <a:fillRef idx="0">
+            <a:schemeClr val="accent1"/>
+          </a:fillRef>
+          <a:effectRef idx="0">
+            <a:schemeClr val="accent1"/>
+          </a:effectRef>
+          <a:fontRef idx="minor">
+            <a:schemeClr val="tx1"/>
+          </a:fontRef>
+        </p:style>
+      </p:cxnSp>
     </p:spTree>
     <p:extLst>
       <p:ext uri="{BB962C8B-B14F-4D97-AF65-F5344CB8AC3E}">
@@ -3609,16 +4306,572 @@
           <a:p>
             <a:r>
               <a:rPr lang="nb-NO" sz="3200" dirty="0" err="1"/>
-              <a:t>Abstraction</a:t>
+              <a:t>Inheritance</a:t>
             </a:r>
             <a:endParaRPr lang="nb-NO" sz="3200" dirty="0"/>
           </a:p>
         </p:txBody>
       </p:sp>
+      <p:sp>
+        <p:nvSpPr>
+          <p:cNvPr id="3" name="TekstSylinder 2">
+            <a:extLst>
+              <a:ext uri="{FF2B5EF4-FFF2-40B4-BE49-F238E27FC236}">
+                <a16:creationId xmlns:a16="http://schemas.microsoft.com/office/drawing/2014/main" id="{E8F8A5C5-CC8C-4718-8355-DA68BE2AD704}"/>
+              </a:ext>
+            </a:extLst>
+          </p:cNvPr>
+          <p:cNvSpPr txBox="1"/>
+          <p:nvPr/>
+        </p:nvSpPr>
+        <p:spPr>
+          <a:xfrm>
+            <a:off x="232757" y="1814916"/>
+            <a:ext cx="3715788" cy="1754326"/>
+          </a:xfrm>
+          <a:prstGeom prst="rect">
+            <a:avLst/>
+          </a:prstGeom>
+          <a:noFill/>
+        </p:spPr>
+        <p:txBody>
+          <a:bodyPr wrap="square" rtlCol="0">
+            <a:spAutoFit/>
+          </a:bodyPr>
+          <a:lstStyle/>
+          <a:p>
+            <a:pPr marL="285750" indent="-285750">
+              <a:buFont typeface="Arial" panose="020B0604020202020204" pitchFamily="34" charset="0"/>
+              <a:buChar char="•"/>
+            </a:pPr>
+            <a:r>
+              <a:rPr lang="nb-NO" dirty="0"/>
+              <a:t>arv </a:t>
+            </a:r>
+          </a:p>
+          <a:p>
+            <a:pPr marL="285750" indent="-285750">
+              <a:buFont typeface="Arial" panose="020B0604020202020204" pitchFamily="34" charset="0"/>
+              <a:buChar char="•"/>
+            </a:pPr>
+            <a:endParaRPr lang="nb-NO" dirty="0"/>
+          </a:p>
+          <a:p>
+            <a:pPr marL="285750" indent="-285750">
+              <a:buFont typeface="Arial" panose="020B0604020202020204" pitchFamily="34" charset="0"/>
+              <a:buChar char="•"/>
+            </a:pPr>
+            <a:r>
+              <a:rPr lang="nb-NO" dirty="0"/>
+              <a:t>Kun en foreldre</a:t>
+            </a:r>
+          </a:p>
+          <a:p>
+            <a:pPr marL="285750" indent="-285750">
+              <a:buFont typeface="Arial" panose="020B0604020202020204" pitchFamily="34" charset="0"/>
+              <a:buChar char="•"/>
+            </a:pPr>
+            <a:endParaRPr lang="nb-NO" dirty="0"/>
+          </a:p>
+          <a:p>
+            <a:pPr marL="285750" indent="-285750">
+              <a:buFont typeface="Arial" panose="020B0604020202020204" pitchFamily="34" charset="0"/>
+              <a:buChar char="•"/>
+            </a:pPr>
+            <a:r>
+              <a:rPr lang="nb-NO" dirty="0" err="1"/>
+              <a:t>protected</a:t>
+            </a:r>
+            <a:r>
+              <a:rPr lang="nb-NO" dirty="0"/>
+              <a:t> variabler eller metoder er synlig for barnet</a:t>
+            </a:r>
+          </a:p>
+        </p:txBody>
+      </p:sp>
+      <p:sp>
+        <p:nvSpPr>
+          <p:cNvPr id="5" name="Rektangel 4">
+            <a:extLst>
+              <a:ext uri="{FF2B5EF4-FFF2-40B4-BE49-F238E27FC236}">
+                <a16:creationId xmlns:a16="http://schemas.microsoft.com/office/drawing/2014/main" id="{BDC93546-3D0F-423A-BAFE-80C756E179C4}"/>
+              </a:ext>
+            </a:extLst>
+          </p:cNvPr>
+          <p:cNvSpPr/>
+          <p:nvPr/>
+        </p:nvSpPr>
+        <p:spPr>
+          <a:xfrm>
+            <a:off x="7423264" y="489008"/>
+            <a:ext cx="2186244" cy="965719"/>
+          </a:xfrm>
+          <a:prstGeom prst="rect">
+            <a:avLst/>
+          </a:prstGeom>
+        </p:spPr>
+        <p:style>
+          <a:lnRef idx="2">
+            <a:schemeClr val="accent1">
+              <a:shade val="50000"/>
+            </a:schemeClr>
+          </a:lnRef>
+          <a:fillRef idx="1">
+            <a:schemeClr val="accent1"/>
+          </a:fillRef>
+          <a:effectRef idx="0">
+            <a:schemeClr val="accent1"/>
+          </a:effectRef>
+          <a:fontRef idx="minor">
+            <a:schemeClr val="lt1"/>
+          </a:fontRef>
+        </p:style>
+        <p:txBody>
+          <a:bodyPr rtlCol="0" anchor="ctr"/>
+          <a:lstStyle/>
+          <a:p>
+            <a:pPr algn="ctr"/>
+            <a:r>
+              <a:rPr lang="nb-NO" dirty="0" err="1"/>
+              <a:t>AbstractXBlock</a:t>
+            </a:r>
+            <a:endParaRPr lang="nb-NO" dirty="0"/>
+          </a:p>
+          <a:p>
+            <a:pPr algn="ctr"/>
+            <a:r>
+              <a:rPr lang="nb-NO" dirty="0">
+                <a:solidFill>
+                  <a:srgbClr val="FF0000"/>
+                </a:solidFill>
+              </a:rPr>
+              <a:t>render()</a:t>
+            </a:r>
+          </a:p>
+        </p:txBody>
+      </p:sp>
+      <p:sp>
+        <p:nvSpPr>
+          <p:cNvPr id="6" name="Rektangel 5">
+            <a:extLst>
+              <a:ext uri="{FF2B5EF4-FFF2-40B4-BE49-F238E27FC236}">
+                <a16:creationId xmlns:a16="http://schemas.microsoft.com/office/drawing/2014/main" id="{FD26FD8A-0C40-4CCB-8EDA-A3C7D2BEC710}"/>
+              </a:ext>
+            </a:extLst>
+          </p:cNvPr>
+          <p:cNvSpPr/>
+          <p:nvPr/>
+        </p:nvSpPr>
+        <p:spPr>
+          <a:xfrm>
+            <a:off x="8670165" y="2415081"/>
+            <a:ext cx="3042459" cy="820277"/>
+          </a:xfrm>
+          <a:prstGeom prst="rect">
+            <a:avLst/>
+          </a:prstGeom>
+        </p:spPr>
+        <p:style>
+          <a:lnRef idx="2">
+            <a:schemeClr val="accent1">
+              <a:shade val="50000"/>
+            </a:schemeClr>
+          </a:lnRef>
+          <a:fillRef idx="1">
+            <a:schemeClr val="accent1"/>
+          </a:fillRef>
+          <a:effectRef idx="0">
+            <a:schemeClr val="accent1"/>
+          </a:effectRef>
+          <a:fontRef idx="minor">
+            <a:schemeClr val="lt1"/>
+          </a:fontRef>
+        </p:style>
+        <p:txBody>
+          <a:bodyPr rtlCol="0" anchor="ctr"/>
+          <a:lstStyle/>
+          <a:p>
+            <a:pPr algn="ctr"/>
+            <a:r>
+              <a:rPr lang="nb-NO" dirty="0" err="1"/>
+              <a:t>ProblemXBlock</a:t>
+            </a:r>
+            <a:endParaRPr lang="nb-NO" dirty="0"/>
+          </a:p>
+          <a:p>
+            <a:pPr algn="ctr"/>
+            <a:r>
+              <a:rPr lang="nb-NO" dirty="0"/>
+              <a:t>$problem</a:t>
+            </a:r>
+          </a:p>
+        </p:txBody>
+      </p:sp>
+      <p:cxnSp>
+        <p:nvCxnSpPr>
+          <p:cNvPr id="7" name="Rett pilkobling 6">
+            <a:extLst>
+              <a:ext uri="{FF2B5EF4-FFF2-40B4-BE49-F238E27FC236}">
+                <a16:creationId xmlns:a16="http://schemas.microsoft.com/office/drawing/2014/main" id="{22CECA54-A12C-4EA1-9DAA-A028ABF9CD65}"/>
+              </a:ext>
+            </a:extLst>
+          </p:cNvPr>
+          <p:cNvCxnSpPr>
+            <a:cxnSpLocks/>
+            <a:endCxn id="6" idx="0"/>
+          </p:cNvCxnSpPr>
+          <p:nvPr/>
+        </p:nvCxnSpPr>
+        <p:spPr>
+          <a:xfrm>
+            <a:off x="8516386" y="608281"/>
+            <a:ext cx="1675009" cy="1806800"/>
+          </a:xfrm>
+          <a:prstGeom prst="straightConnector1">
+            <a:avLst/>
+          </a:prstGeom>
+          <a:ln>
+            <a:tailEnd type="triangle"/>
+          </a:ln>
+        </p:spPr>
+        <p:style>
+          <a:lnRef idx="1">
+            <a:schemeClr val="accent1"/>
+          </a:lnRef>
+          <a:fillRef idx="0">
+            <a:schemeClr val="accent1"/>
+          </a:fillRef>
+          <a:effectRef idx="0">
+            <a:schemeClr val="accent1"/>
+          </a:effectRef>
+          <a:fontRef idx="minor">
+            <a:schemeClr val="tx1"/>
+          </a:fontRef>
+        </p:style>
+      </p:cxnSp>
+      <p:sp>
+        <p:nvSpPr>
+          <p:cNvPr id="8" name="Rektangel 7">
+            <a:extLst>
+              <a:ext uri="{FF2B5EF4-FFF2-40B4-BE49-F238E27FC236}">
+                <a16:creationId xmlns:a16="http://schemas.microsoft.com/office/drawing/2014/main" id="{4F24C07D-9C8C-4B6E-A9E6-DA96C7251EA6}"/>
+              </a:ext>
+            </a:extLst>
+          </p:cNvPr>
+          <p:cNvSpPr/>
+          <p:nvPr/>
+        </p:nvSpPr>
+        <p:spPr>
+          <a:xfrm>
+            <a:off x="4524425" y="2388912"/>
+            <a:ext cx="3042459" cy="820277"/>
+          </a:xfrm>
+          <a:prstGeom prst="rect">
+            <a:avLst/>
+          </a:prstGeom>
+        </p:spPr>
+        <p:style>
+          <a:lnRef idx="3">
+            <a:schemeClr val="lt1"/>
+          </a:lnRef>
+          <a:fillRef idx="1">
+            <a:schemeClr val="accent6"/>
+          </a:fillRef>
+          <a:effectRef idx="1">
+            <a:schemeClr val="accent6"/>
+          </a:effectRef>
+          <a:fontRef idx="minor">
+            <a:schemeClr val="lt1"/>
+          </a:fontRef>
+        </p:style>
+        <p:txBody>
+          <a:bodyPr rtlCol="0" anchor="ctr"/>
+          <a:lstStyle/>
+          <a:p>
+            <a:pPr algn="ctr"/>
+            <a:r>
+              <a:rPr lang="nb-NO" dirty="0" err="1"/>
+              <a:t>TextXBlock</a:t>
+            </a:r>
+            <a:endParaRPr lang="nb-NO" dirty="0"/>
+          </a:p>
+          <a:p>
+            <a:pPr algn="ctr"/>
+            <a:r>
+              <a:rPr lang="nb-NO" dirty="0">
+                <a:solidFill>
+                  <a:schemeClr val="tx1"/>
+                </a:solidFill>
+              </a:rPr>
+              <a:t>render()</a:t>
+            </a:r>
+          </a:p>
+        </p:txBody>
+      </p:sp>
+      <p:cxnSp>
+        <p:nvCxnSpPr>
+          <p:cNvPr id="9" name="Rett pilkobling 8">
+            <a:extLst>
+              <a:ext uri="{FF2B5EF4-FFF2-40B4-BE49-F238E27FC236}">
+                <a16:creationId xmlns:a16="http://schemas.microsoft.com/office/drawing/2014/main" id="{BDDB7F02-5AA8-4350-B3F6-D7A66C9A7265}"/>
+              </a:ext>
+            </a:extLst>
+          </p:cNvPr>
+          <p:cNvCxnSpPr>
+            <a:cxnSpLocks/>
+            <a:stCxn id="5" idx="2"/>
+            <a:endCxn id="8" idx="0"/>
+          </p:cNvCxnSpPr>
+          <p:nvPr/>
+        </p:nvCxnSpPr>
+        <p:spPr>
+          <a:xfrm flipH="1">
+            <a:off x="6045655" y="1454727"/>
+            <a:ext cx="2470731" cy="934185"/>
+          </a:xfrm>
+          <a:prstGeom prst="straightConnector1">
+            <a:avLst/>
+          </a:prstGeom>
+          <a:ln>
+            <a:tailEnd type="triangle"/>
+          </a:ln>
+        </p:spPr>
+        <p:style>
+          <a:lnRef idx="1">
+            <a:schemeClr val="accent1"/>
+          </a:lnRef>
+          <a:fillRef idx="0">
+            <a:schemeClr val="accent1"/>
+          </a:fillRef>
+          <a:effectRef idx="0">
+            <a:schemeClr val="accent1"/>
+          </a:effectRef>
+          <a:fontRef idx="minor">
+            <a:schemeClr val="tx1"/>
+          </a:fontRef>
+        </p:style>
+      </p:cxnSp>
+      <p:sp>
+        <p:nvSpPr>
+          <p:cNvPr id="10" name="Rektangel 9">
+            <a:extLst>
+              <a:ext uri="{FF2B5EF4-FFF2-40B4-BE49-F238E27FC236}">
+                <a16:creationId xmlns:a16="http://schemas.microsoft.com/office/drawing/2014/main" id="{A9D8EFA0-A2D7-41D8-B9E1-6085B2AF95FF}"/>
+              </a:ext>
+            </a:extLst>
+          </p:cNvPr>
+          <p:cNvSpPr/>
+          <p:nvPr/>
+        </p:nvSpPr>
+        <p:spPr>
+          <a:xfrm>
+            <a:off x="8682626" y="5270802"/>
+            <a:ext cx="3042459" cy="820277"/>
+          </a:xfrm>
+          <a:prstGeom prst="rect">
+            <a:avLst/>
+          </a:prstGeom>
+        </p:spPr>
+        <p:style>
+          <a:lnRef idx="3">
+            <a:schemeClr val="lt1"/>
+          </a:lnRef>
+          <a:fillRef idx="1">
+            <a:schemeClr val="accent6"/>
+          </a:fillRef>
+          <a:effectRef idx="1">
+            <a:schemeClr val="accent6"/>
+          </a:effectRef>
+          <a:fontRef idx="minor">
+            <a:schemeClr val="lt1"/>
+          </a:fontRef>
+        </p:style>
+        <p:txBody>
+          <a:bodyPr rtlCol="0" anchor="ctr"/>
+          <a:lstStyle/>
+          <a:p>
+            <a:pPr algn="ctr"/>
+            <a:r>
+              <a:rPr lang="nb-NO" dirty="0" err="1"/>
+              <a:t>MathGradedXBlock</a:t>
+            </a:r>
+            <a:endParaRPr lang="nb-NO" dirty="0"/>
+          </a:p>
+          <a:p>
+            <a:pPr algn="ctr"/>
+            <a:r>
+              <a:rPr lang="nb-NO" dirty="0">
+                <a:solidFill>
+                  <a:schemeClr val="tx1"/>
+                </a:solidFill>
+              </a:rPr>
+              <a:t>render()</a:t>
+            </a:r>
+          </a:p>
+          <a:p>
+            <a:pPr algn="ctr"/>
+            <a:r>
+              <a:rPr lang="nb-NO" dirty="0">
+                <a:solidFill>
+                  <a:schemeClr val="tx1"/>
+                </a:solidFill>
+              </a:rPr>
+              <a:t>grade()</a:t>
+            </a:r>
+          </a:p>
+        </p:txBody>
+      </p:sp>
+      <p:cxnSp>
+        <p:nvCxnSpPr>
+          <p:cNvPr id="11" name="Rett pilkobling 10">
+            <a:extLst>
+              <a:ext uri="{FF2B5EF4-FFF2-40B4-BE49-F238E27FC236}">
+                <a16:creationId xmlns:a16="http://schemas.microsoft.com/office/drawing/2014/main" id="{DF5D743A-8D40-4B2E-98E0-1C21D9663D90}"/>
+              </a:ext>
+            </a:extLst>
+          </p:cNvPr>
+          <p:cNvCxnSpPr>
+            <a:cxnSpLocks/>
+            <a:stCxn id="12" idx="2"/>
+            <a:endCxn id="10" idx="0"/>
+          </p:cNvCxnSpPr>
+          <p:nvPr/>
+        </p:nvCxnSpPr>
+        <p:spPr>
+          <a:xfrm>
+            <a:off x="10191394" y="4605850"/>
+            <a:ext cx="12462" cy="664952"/>
+          </a:xfrm>
+          <a:prstGeom prst="straightConnector1">
+            <a:avLst/>
+          </a:prstGeom>
+          <a:ln>
+            <a:tailEnd type="triangle"/>
+          </a:ln>
+        </p:spPr>
+        <p:style>
+          <a:lnRef idx="1">
+            <a:schemeClr val="accent1"/>
+          </a:lnRef>
+          <a:fillRef idx="0">
+            <a:schemeClr val="accent1"/>
+          </a:fillRef>
+          <a:effectRef idx="0">
+            <a:schemeClr val="accent1"/>
+          </a:effectRef>
+          <a:fontRef idx="minor">
+            <a:schemeClr val="tx1"/>
+          </a:fontRef>
+        </p:style>
+      </p:cxnSp>
+      <p:sp>
+        <p:nvSpPr>
+          <p:cNvPr id="12" name="Rektangel 11">
+            <a:extLst>
+              <a:ext uri="{FF2B5EF4-FFF2-40B4-BE49-F238E27FC236}">
+                <a16:creationId xmlns:a16="http://schemas.microsoft.com/office/drawing/2014/main" id="{4F81046E-5476-435D-B2EA-FC846BBD714E}"/>
+              </a:ext>
+            </a:extLst>
+          </p:cNvPr>
+          <p:cNvSpPr/>
+          <p:nvPr/>
+        </p:nvSpPr>
+        <p:spPr>
+          <a:xfrm>
+            <a:off x="8670164" y="3785573"/>
+            <a:ext cx="3042459" cy="820277"/>
+          </a:xfrm>
+          <a:prstGeom prst="rect">
+            <a:avLst/>
+          </a:prstGeom>
+        </p:spPr>
+        <p:style>
+          <a:lnRef idx="2">
+            <a:schemeClr val="accent1">
+              <a:shade val="50000"/>
+            </a:schemeClr>
+          </a:lnRef>
+          <a:fillRef idx="1">
+            <a:schemeClr val="accent1"/>
+          </a:fillRef>
+          <a:effectRef idx="0">
+            <a:schemeClr val="accent1"/>
+          </a:effectRef>
+          <a:fontRef idx="minor">
+            <a:schemeClr val="lt1"/>
+          </a:fontRef>
+        </p:style>
+        <p:txBody>
+          <a:bodyPr rtlCol="0" anchor="ctr"/>
+          <a:lstStyle/>
+          <a:p>
+            <a:pPr algn="ctr"/>
+            <a:r>
+              <a:rPr lang="nb-NO" dirty="0" err="1"/>
+              <a:t>AbstractGradedProblemXBlock</a:t>
+            </a:r>
+            <a:endParaRPr lang="nb-NO" dirty="0"/>
+          </a:p>
+          <a:p>
+            <a:pPr algn="ctr"/>
+            <a:r>
+              <a:rPr lang="nb-NO" dirty="0">
+                <a:solidFill>
+                  <a:srgbClr val="FF0000"/>
+                </a:solidFill>
+              </a:rPr>
+              <a:t>grade()</a:t>
+            </a:r>
+          </a:p>
+        </p:txBody>
+      </p:sp>
+      <p:cxnSp>
+        <p:nvCxnSpPr>
+          <p:cNvPr id="13" name="Rett pilkobling 12">
+            <a:extLst>
+              <a:ext uri="{FF2B5EF4-FFF2-40B4-BE49-F238E27FC236}">
+                <a16:creationId xmlns:a16="http://schemas.microsoft.com/office/drawing/2014/main" id="{BF71DD3C-0B51-44B5-B0E7-359F1D4E5195}"/>
+              </a:ext>
+            </a:extLst>
+          </p:cNvPr>
+          <p:cNvCxnSpPr>
+            <a:cxnSpLocks/>
+            <a:stCxn id="6" idx="2"/>
+            <a:endCxn id="12" idx="0"/>
+          </p:cNvCxnSpPr>
+          <p:nvPr/>
+        </p:nvCxnSpPr>
+        <p:spPr>
+          <a:xfrm flipH="1">
+            <a:off x="10191394" y="3235358"/>
+            <a:ext cx="1" cy="550215"/>
+          </a:xfrm>
+          <a:prstGeom prst="straightConnector1">
+            <a:avLst/>
+          </a:prstGeom>
+          <a:ln>
+            <a:tailEnd type="triangle"/>
+          </a:ln>
+        </p:spPr>
+        <p:style>
+          <a:lnRef idx="1">
+            <a:schemeClr val="accent1"/>
+          </a:lnRef>
+          <a:fillRef idx="0">
+            <a:schemeClr val="accent1"/>
+          </a:fillRef>
+          <a:effectRef idx="0">
+            <a:schemeClr val="accent1"/>
+          </a:effectRef>
+          <a:fontRef idx="minor">
+            <a:schemeClr val="tx1"/>
+          </a:fontRef>
+        </p:style>
+      </p:cxnSp>
     </p:spTree>
     <p:extLst>
       <p:ext uri="{BB962C8B-B14F-4D97-AF65-F5344CB8AC3E}">
-        <p14:creationId xmlns:p14="http://schemas.microsoft.com/office/powerpoint/2010/main" val="4264426230"/>
+        <p14:creationId xmlns:p14="http://schemas.microsoft.com/office/powerpoint/2010/main" val="215719289"/>
       </p:ext>
     </p:extLst>
   </p:cSld>
@@ -3675,16 +4928,580 @@
           <a:p>
             <a:r>
               <a:rPr lang="nb-NO" sz="3200" dirty="0" err="1"/>
-              <a:t>Inheritance</a:t>
+              <a:t>Abstraction</a:t>
             </a:r>
             <a:endParaRPr lang="nb-NO" sz="3200" dirty="0"/>
           </a:p>
         </p:txBody>
       </p:sp>
+      <p:sp>
+        <p:nvSpPr>
+          <p:cNvPr id="3" name="TekstSylinder 2">
+            <a:extLst>
+              <a:ext uri="{FF2B5EF4-FFF2-40B4-BE49-F238E27FC236}">
+                <a16:creationId xmlns:a16="http://schemas.microsoft.com/office/drawing/2014/main" id="{90CE216F-DB65-46C4-AE83-7FCE1586E21B}"/>
+              </a:ext>
+            </a:extLst>
+          </p:cNvPr>
+          <p:cNvSpPr txBox="1"/>
+          <p:nvPr/>
+        </p:nvSpPr>
+        <p:spPr>
+          <a:xfrm>
+            <a:off x="232757" y="1814916"/>
+            <a:ext cx="3715788" cy="1200329"/>
+          </a:xfrm>
+          <a:prstGeom prst="rect">
+            <a:avLst/>
+          </a:prstGeom>
+          <a:noFill/>
+        </p:spPr>
+        <p:txBody>
+          <a:bodyPr wrap="square" rtlCol="0">
+            <a:spAutoFit/>
+          </a:bodyPr>
+          <a:lstStyle/>
+          <a:p>
+            <a:pPr marL="285750" indent="-285750">
+              <a:buFont typeface="Arial" panose="020B0604020202020204" pitchFamily="34" charset="0"/>
+              <a:buChar char="•"/>
+            </a:pPr>
+            <a:r>
+              <a:rPr lang="nb-NO" dirty="0" err="1"/>
+              <a:t>abstract</a:t>
+            </a:r>
+            <a:r>
+              <a:rPr lang="nb-NO" dirty="0"/>
+              <a:t> </a:t>
+            </a:r>
+            <a:r>
+              <a:rPr lang="nb-NO" dirty="0" err="1"/>
+              <a:t>class</a:t>
+            </a:r>
+            <a:endParaRPr lang="nb-NO" dirty="0"/>
+          </a:p>
+          <a:p>
+            <a:pPr marL="285750" indent="-285750">
+              <a:buFont typeface="Arial" panose="020B0604020202020204" pitchFamily="34" charset="0"/>
+              <a:buChar char="•"/>
+            </a:pPr>
+            <a:endParaRPr lang="nb-NO" dirty="0"/>
+          </a:p>
+          <a:p>
+            <a:pPr marL="285750" indent="-285750">
+              <a:buFont typeface="Arial" panose="020B0604020202020204" pitchFamily="34" charset="0"/>
+              <a:buChar char="•"/>
+            </a:pPr>
+            <a:r>
+              <a:rPr lang="nb-NO" dirty="0" err="1"/>
+              <a:t>interface</a:t>
+            </a:r>
+            <a:r>
+              <a:rPr lang="nb-NO" dirty="0"/>
+              <a:t> (høyere nivå enn </a:t>
+            </a:r>
+            <a:r>
+              <a:rPr lang="nb-NO" dirty="0" err="1"/>
+              <a:t>abstract</a:t>
+            </a:r>
+            <a:r>
+              <a:rPr lang="nb-NO" dirty="0"/>
+              <a:t> </a:t>
+            </a:r>
+            <a:r>
+              <a:rPr lang="nb-NO" dirty="0" err="1"/>
+              <a:t>class</a:t>
+            </a:r>
+            <a:r>
+              <a:rPr lang="nb-NO" dirty="0"/>
+              <a:t>)</a:t>
+            </a:r>
+          </a:p>
+        </p:txBody>
+      </p:sp>
+      <p:sp>
+        <p:nvSpPr>
+          <p:cNvPr id="2" name="Rektangel 1">
+            <a:extLst>
+              <a:ext uri="{FF2B5EF4-FFF2-40B4-BE49-F238E27FC236}">
+                <a16:creationId xmlns:a16="http://schemas.microsoft.com/office/drawing/2014/main" id="{10F6FDC3-ECDA-4C9A-85A3-0005DC134EA4}"/>
+              </a:ext>
+            </a:extLst>
+          </p:cNvPr>
+          <p:cNvSpPr/>
+          <p:nvPr/>
+        </p:nvSpPr>
+        <p:spPr>
+          <a:xfrm>
+            <a:off x="7423264" y="489008"/>
+            <a:ext cx="2186244" cy="965719"/>
+          </a:xfrm>
+          <a:prstGeom prst="rect">
+            <a:avLst/>
+          </a:prstGeom>
+        </p:spPr>
+        <p:style>
+          <a:lnRef idx="2">
+            <a:schemeClr val="accent1">
+              <a:shade val="50000"/>
+            </a:schemeClr>
+          </a:lnRef>
+          <a:fillRef idx="1">
+            <a:schemeClr val="accent1"/>
+          </a:fillRef>
+          <a:effectRef idx="0">
+            <a:schemeClr val="accent1"/>
+          </a:effectRef>
+          <a:fontRef idx="minor">
+            <a:schemeClr val="lt1"/>
+          </a:fontRef>
+        </p:style>
+        <p:txBody>
+          <a:bodyPr rtlCol="0" anchor="ctr"/>
+          <a:lstStyle/>
+          <a:p>
+            <a:pPr algn="ctr"/>
+            <a:r>
+              <a:rPr lang="nb-NO" dirty="0" err="1"/>
+              <a:t>AbstractXBlock</a:t>
+            </a:r>
+            <a:endParaRPr lang="nb-NO" dirty="0"/>
+          </a:p>
+          <a:p>
+            <a:pPr algn="ctr"/>
+            <a:r>
+              <a:rPr lang="nb-NO" dirty="0">
+                <a:solidFill>
+                  <a:srgbClr val="FF0000"/>
+                </a:solidFill>
+              </a:rPr>
+              <a:t>render()</a:t>
+            </a:r>
+          </a:p>
+        </p:txBody>
+      </p:sp>
+      <p:sp>
+        <p:nvSpPr>
+          <p:cNvPr id="5" name="Rektangel 4">
+            <a:extLst>
+              <a:ext uri="{FF2B5EF4-FFF2-40B4-BE49-F238E27FC236}">
+                <a16:creationId xmlns:a16="http://schemas.microsoft.com/office/drawing/2014/main" id="{580D9634-A39B-4631-B804-9D102F66953D}"/>
+              </a:ext>
+            </a:extLst>
+          </p:cNvPr>
+          <p:cNvSpPr/>
+          <p:nvPr/>
+        </p:nvSpPr>
+        <p:spPr>
+          <a:xfrm>
+            <a:off x="8670165" y="2415081"/>
+            <a:ext cx="3042459" cy="820277"/>
+          </a:xfrm>
+          <a:prstGeom prst="rect">
+            <a:avLst/>
+          </a:prstGeom>
+        </p:spPr>
+        <p:style>
+          <a:lnRef idx="2">
+            <a:schemeClr val="accent1">
+              <a:shade val="50000"/>
+            </a:schemeClr>
+          </a:lnRef>
+          <a:fillRef idx="1">
+            <a:schemeClr val="accent1"/>
+          </a:fillRef>
+          <a:effectRef idx="0">
+            <a:schemeClr val="accent1"/>
+          </a:effectRef>
+          <a:fontRef idx="minor">
+            <a:schemeClr val="lt1"/>
+          </a:fontRef>
+        </p:style>
+        <p:txBody>
+          <a:bodyPr rtlCol="0" anchor="ctr"/>
+          <a:lstStyle/>
+          <a:p>
+            <a:pPr algn="ctr"/>
+            <a:r>
+              <a:rPr lang="nb-NO" dirty="0" err="1"/>
+              <a:t>ProblemXBlock</a:t>
+            </a:r>
+            <a:endParaRPr lang="nb-NO" dirty="0"/>
+          </a:p>
+          <a:p>
+            <a:pPr algn="ctr"/>
+            <a:r>
+              <a:rPr lang="nb-NO" dirty="0"/>
+              <a:t>$problem</a:t>
+            </a:r>
+          </a:p>
+        </p:txBody>
+      </p:sp>
+      <p:cxnSp>
+        <p:nvCxnSpPr>
+          <p:cNvPr id="7" name="Rett pilkobling 6">
+            <a:extLst>
+              <a:ext uri="{FF2B5EF4-FFF2-40B4-BE49-F238E27FC236}">
+                <a16:creationId xmlns:a16="http://schemas.microsoft.com/office/drawing/2014/main" id="{B812FC97-E6B5-4CE7-85A1-B50EC2324D47}"/>
+              </a:ext>
+            </a:extLst>
+          </p:cNvPr>
+          <p:cNvCxnSpPr>
+            <a:cxnSpLocks/>
+            <a:endCxn id="5" idx="0"/>
+          </p:cNvCxnSpPr>
+          <p:nvPr/>
+        </p:nvCxnSpPr>
+        <p:spPr>
+          <a:xfrm>
+            <a:off x="8516386" y="608281"/>
+            <a:ext cx="1675009" cy="1806800"/>
+          </a:xfrm>
+          <a:prstGeom prst="straightConnector1">
+            <a:avLst/>
+          </a:prstGeom>
+          <a:ln>
+            <a:tailEnd type="triangle"/>
+          </a:ln>
+        </p:spPr>
+        <p:style>
+          <a:lnRef idx="1">
+            <a:schemeClr val="accent1"/>
+          </a:lnRef>
+          <a:fillRef idx="0">
+            <a:schemeClr val="accent1"/>
+          </a:fillRef>
+          <a:effectRef idx="0">
+            <a:schemeClr val="accent1"/>
+          </a:effectRef>
+          <a:fontRef idx="minor">
+            <a:schemeClr val="tx1"/>
+          </a:fontRef>
+        </p:style>
+      </p:cxnSp>
+      <p:sp>
+        <p:nvSpPr>
+          <p:cNvPr id="9" name="Rektangel 8">
+            <a:extLst>
+              <a:ext uri="{FF2B5EF4-FFF2-40B4-BE49-F238E27FC236}">
+                <a16:creationId xmlns:a16="http://schemas.microsoft.com/office/drawing/2014/main" id="{690F9ED2-40D2-44BB-99BC-FCCD887C364C}"/>
+              </a:ext>
+            </a:extLst>
+          </p:cNvPr>
+          <p:cNvSpPr/>
+          <p:nvPr/>
+        </p:nvSpPr>
+        <p:spPr>
+          <a:xfrm>
+            <a:off x="4524425" y="2388912"/>
+            <a:ext cx="3042459" cy="820277"/>
+          </a:xfrm>
+          <a:prstGeom prst="rect">
+            <a:avLst/>
+          </a:prstGeom>
+        </p:spPr>
+        <p:style>
+          <a:lnRef idx="3">
+            <a:schemeClr val="lt1"/>
+          </a:lnRef>
+          <a:fillRef idx="1">
+            <a:schemeClr val="accent6"/>
+          </a:fillRef>
+          <a:effectRef idx="1">
+            <a:schemeClr val="accent6"/>
+          </a:effectRef>
+          <a:fontRef idx="minor">
+            <a:schemeClr val="lt1"/>
+          </a:fontRef>
+        </p:style>
+        <p:txBody>
+          <a:bodyPr rtlCol="0" anchor="ctr"/>
+          <a:lstStyle/>
+          <a:p>
+            <a:pPr algn="ctr"/>
+            <a:r>
+              <a:rPr lang="nb-NO" dirty="0" err="1"/>
+              <a:t>TextXBlock</a:t>
+            </a:r>
+            <a:endParaRPr lang="nb-NO" dirty="0"/>
+          </a:p>
+          <a:p>
+            <a:pPr algn="ctr"/>
+            <a:r>
+              <a:rPr lang="nb-NO" dirty="0">
+                <a:solidFill>
+                  <a:schemeClr val="tx1"/>
+                </a:solidFill>
+              </a:rPr>
+              <a:t>render()</a:t>
+            </a:r>
+          </a:p>
+        </p:txBody>
+      </p:sp>
+      <p:cxnSp>
+        <p:nvCxnSpPr>
+          <p:cNvPr id="10" name="Rett pilkobling 9">
+            <a:extLst>
+              <a:ext uri="{FF2B5EF4-FFF2-40B4-BE49-F238E27FC236}">
+                <a16:creationId xmlns:a16="http://schemas.microsoft.com/office/drawing/2014/main" id="{9D6948C5-B80E-4681-84A7-CC9FD6CC88D1}"/>
+              </a:ext>
+            </a:extLst>
+          </p:cNvPr>
+          <p:cNvCxnSpPr>
+            <a:cxnSpLocks/>
+            <a:stCxn id="2" idx="2"/>
+            <a:endCxn id="9" idx="0"/>
+          </p:cNvCxnSpPr>
+          <p:nvPr/>
+        </p:nvCxnSpPr>
+        <p:spPr>
+          <a:xfrm flipH="1">
+            <a:off x="6045655" y="1454727"/>
+            <a:ext cx="2470731" cy="934185"/>
+          </a:xfrm>
+          <a:prstGeom prst="straightConnector1">
+            <a:avLst/>
+          </a:prstGeom>
+          <a:ln>
+            <a:tailEnd type="triangle"/>
+          </a:ln>
+        </p:spPr>
+        <p:style>
+          <a:lnRef idx="1">
+            <a:schemeClr val="accent1"/>
+          </a:lnRef>
+          <a:fillRef idx="0">
+            <a:schemeClr val="accent1"/>
+          </a:fillRef>
+          <a:effectRef idx="0">
+            <a:schemeClr val="accent1"/>
+          </a:effectRef>
+          <a:fontRef idx="minor">
+            <a:schemeClr val="tx1"/>
+          </a:fontRef>
+        </p:style>
+      </p:cxnSp>
+      <p:sp>
+        <p:nvSpPr>
+          <p:cNvPr id="13" name="Rektangel 12">
+            <a:extLst>
+              <a:ext uri="{FF2B5EF4-FFF2-40B4-BE49-F238E27FC236}">
+                <a16:creationId xmlns:a16="http://schemas.microsoft.com/office/drawing/2014/main" id="{B7978C77-D2F8-42E0-AF2B-373B5DAF1BBC}"/>
+              </a:ext>
+            </a:extLst>
+          </p:cNvPr>
+          <p:cNvSpPr/>
+          <p:nvPr/>
+        </p:nvSpPr>
+        <p:spPr>
+          <a:xfrm>
+            <a:off x="8682626" y="5270802"/>
+            <a:ext cx="3042459" cy="820277"/>
+          </a:xfrm>
+          <a:prstGeom prst="rect">
+            <a:avLst/>
+          </a:prstGeom>
+        </p:spPr>
+        <p:style>
+          <a:lnRef idx="3">
+            <a:schemeClr val="lt1"/>
+          </a:lnRef>
+          <a:fillRef idx="1">
+            <a:schemeClr val="accent6"/>
+          </a:fillRef>
+          <a:effectRef idx="1">
+            <a:schemeClr val="accent6"/>
+          </a:effectRef>
+          <a:fontRef idx="minor">
+            <a:schemeClr val="lt1"/>
+          </a:fontRef>
+        </p:style>
+        <p:txBody>
+          <a:bodyPr rtlCol="0" anchor="ctr"/>
+          <a:lstStyle/>
+          <a:p>
+            <a:pPr algn="ctr"/>
+            <a:r>
+              <a:rPr lang="nb-NO" dirty="0" err="1"/>
+              <a:t>MathGradedXBlock</a:t>
+            </a:r>
+            <a:endParaRPr lang="nb-NO" dirty="0"/>
+          </a:p>
+          <a:p>
+            <a:pPr algn="ctr"/>
+            <a:r>
+              <a:rPr lang="nb-NO" dirty="0">
+                <a:solidFill>
+                  <a:schemeClr val="tx1"/>
+                </a:solidFill>
+              </a:rPr>
+              <a:t>render()</a:t>
+            </a:r>
+          </a:p>
+          <a:p>
+            <a:pPr algn="ctr"/>
+            <a:r>
+              <a:rPr lang="nb-NO" dirty="0">
+                <a:solidFill>
+                  <a:schemeClr val="tx1"/>
+                </a:solidFill>
+              </a:rPr>
+              <a:t>grade()</a:t>
+            </a:r>
+          </a:p>
+        </p:txBody>
+      </p:sp>
+      <p:cxnSp>
+        <p:nvCxnSpPr>
+          <p:cNvPr id="14" name="Rett pilkobling 13">
+            <a:extLst>
+              <a:ext uri="{FF2B5EF4-FFF2-40B4-BE49-F238E27FC236}">
+                <a16:creationId xmlns:a16="http://schemas.microsoft.com/office/drawing/2014/main" id="{73426FB4-C398-4174-95B9-D25A4526A2D9}"/>
+              </a:ext>
+            </a:extLst>
+          </p:cNvPr>
+          <p:cNvCxnSpPr>
+            <a:cxnSpLocks/>
+            <a:stCxn id="19" idx="2"/>
+            <a:endCxn id="13" idx="0"/>
+          </p:cNvCxnSpPr>
+          <p:nvPr/>
+        </p:nvCxnSpPr>
+        <p:spPr>
+          <a:xfrm>
+            <a:off x="10191394" y="4605850"/>
+            <a:ext cx="12462" cy="664952"/>
+          </a:xfrm>
+          <a:prstGeom prst="straightConnector1">
+            <a:avLst/>
+          </a:prstGeom>
+          <a:ln>
+            <a:tailEnd type="triangle"/>
+          </a:ln>
+        </p:spPr>
+        <p:style>
+          <a:lnRef idx="1">
+            <a:schemeClr val="accent1"/>
+          </a:lnRef>
+          <a:fillRef idx="0">
+            <a:schemeClr val="accent1"/>
+          </a:fillRef>
+          <a:effectRef idx="0">
+            <a:schemeClr val="accent1"/>
+          </a:effectRef>
+          <a:fontRef idx="minor">
+            <a:schemeClr val="tx1"/>
+          </a:fontRef>
+        </p:style>
+      </p:cxnSp>
+      <p:sp>
+        <p:nvSpPr>
+          <p:cNvPr id="19" name="Rektangel 18">
+            <a:extLst>
+              <a:ext uri="{FF2B5EF4-FFF2-40B4-BE49-F238E27FC236}">
+                <a16:creationId xmlns:a16="http://schemas.microsoft.com/office/drawing/2014/main" id="{2F176E81-4F04-4CDD-B2C6-468FB0B692B0}"/>
+              </a:ext>
+            </a:extLst>
+          </p:cNvPr>
+          <p:cNvSpPr/>
+          <p:nvPr/>
+        </p:nvSpPr>
+        <p:spPr>
+          <a:xfrm>
+            <a:off x="8670164" y="3785573"/>
+            <a:ext cx="3042459" cy="820277"/>
+          </a:xfrm>
+          <a:prstGeom prst="rect">
+            <a:avLst/>
+          </a:prstGeom>
+        </p:spPr>
+        <p:style>
+          <a:lnRef idx="2">
+            <a:schemeClr val="accent1">
+              <a:shade val="50000"/>
+            </a:schemeClr>
+          </a:lnRef>
+          <a:fillRef idx="1">
+            <a:schemeClr val="accent1"/>
+          </a:fillRef>
+          <a:effectRef idx="0">
+            <a:schemeClr val="accent1"/>
+          </a:effectRef>
+          <a:fontRef idx="minor">
+            <a:schemeClr val="lt1"/>
+          </a:fontRef>
+        </p:style>
+        <p:txBody>
+          <a:bodyPr rtlCol="0" anchor="ctr"/>
+          <a:lstStyle/>
+          <a:p>
+            <a:pPr algn="ctr"/>
+            <a:r>
+              <a:rPr lang="nb-NO" dirty="0" err="1"/>
+              <a:t>AbstractGradedProblemXBlock</a:t>
+            </a:r>
+            <a:endParaRPr lang="nb-NO" dirty="0"/>
+          </a:p>
+          <a:p>
+            <a:pPr algn="ctr"/>
+            <a:r>
+              <a:rPr lang="nb-NO" dirty="0">
+                <a:solidFill>
+                  <a:srgbClr val="FF0000"/>
+                </a:solidFill>
+              </a:rPr>
+              <a:t>grade()</a:t>
+            </a:r>
+          </a:p>
+        </p:txBody>
+      </p:sp>
+      <p:cxnSp>
+        <p:nvCxnSpPr>
+          <p:cNvPr id="22" name="Rett pilkobling 21">
+            <a:extLst>
+              <a:ext uri="{FF2B5EF4-FFF2-40B4-BE49-F238E27FC236}">
+                <a16:creationId xmlns:a16="http://schemas.microsoft.com/office/drawing/2014/main" id="{BC0A2A56-E198-4AFA-83F8-8208CE7564C7}"/>
+              </a:ext>
+            </a:extLst>
+          </p:cNvPr>
+          <p:cNvCxnSpPr>
+            <a:cxnSpLocks/>
+            <a:stCxn id="5" idx="2"/>
+            <a:endCxn id="19" idx="0"/>
+          </p:cNvCxnSpPr>
+          <p:nvPr/>
+        </p:nvCxnSpPr>
+        <p:spPr>
+          <a:xfrm flipH="1">
+            <a:off x="10191394" y="3235358"/>
+            <a:ext cx="1" cy="550215"/>
+          </a:xfrm>
+          <a:prstGeom prst="straightConnector1">
+            <a:avLst/>
+          </a:prstGeom>
+          <a:ln>
+            <a:tailEnd type="triangle"/>
+          </a:ln>
+        </p:spPr>
+        <p:style>
+          <a:lnRef idx="1">
+            <a:schemeClr val="accent1"/>
+          </a:lnRef>
+          <a:fillRef idx="0">
+            <a:schemeClr val="accent1"/>
+          </a:fillRef>
+          <a:effectRef idx="0">
+            <a:schemeClr val="accent1"/>
+          </a:effectRef>
+          <a:fontRef idx="minor">
+            <a:schemeClr val="tx1"/>
+          </a:fontRef>
+        </p:style>
+      </p:cxnSp>
     </p:spTree>
     <p:extLst>
       <p:ext uri="{BB962C8B-B14F-4D97-AF65-F5344CB8AC3E}">
-        <p14:creationId xmlns:p14="http://schemas.microsoft.com/office/powerpoint/2010/main" val="215719289"/>
+        <p14:creationId xmlns:p14="http://schemas.microsoft.com/office/powerpoint/2010/main" val="4264426230"/>
       </p:ext>
     </p:extLst>
   </p:cSld>
@@ -3747,6 +5564,117 @@
           </a:p>
         </p:txBody>
       </p:sp>
+      <p:sp>
+        <p:nvSpPr>
+          <p:cNvPr id="3" name="TekstSylinder 2">
+            <a:extLst>
+              <a:ext uri="{FF2B5EF4-FFF2-40B4-BE49-F238E27FC236}">
+                <a16:creationId xmlns:a16="http://schemas.microsoft.com/office/drawing/2014/main" id="{9B7F0AA5-65BC-40BD-976D-86766E7AC5C4}"/>
+              </a:ext>
+            </a:extLst>
+          </p:cNvPr>
+          <p:cNvSpPr txBox="1"/>
+          <p:nvPr/>
+        </p:nvSpPr>
+        <p:spPr>
+          <a:xfrm>
+            <a:off x="232757" y="1814916"/>
+            <a:ext cx="3715788" cy="1477328"/>
+          </a:xfrm>
+          <a:prstGeom prst="rect">
+            <a:avLst/>
+          </a:prstGeom>
+          <a:noFill/>
+        </p:spPr>
+        <p:txBody>
+          <a:bodyPr wrap="square" rtlCol="0">
+            <a:spAutoFit/>
+          </a:bodyPr>
+          <a:lstStyle/>
+          <a:p>
+            <a:pPr marL="285750" indent="-285750">
+              <a:buFont typeface="Arial" panose="020B0604020202020204" pitchFamily="34" charset="0"/>
+              <a:buChar char="•"/>
+            </a:pPr>
+            <a:r>
+              <a:rPr lang="nb-NO" dirty="0"/>
+              <a:t>«</a:t>
+            </a:r>
+            <a:r>
+              <a:rPr lang="nb-NO" dirty="0" err="1"/>
+              <a:t>many</a:t>
+            </a:r>
+            <a:r>
+              <a:rPr lang="nb-NO" dirty="0"/>
+              <a:t> </a:t>
+            </a:r>
+            <a:r>
+              <a:rPr lang="nb-NO" dirty="0" err="1"/>
+              <a:t>shapes</a:t>
+            </a:r>
+            <a:r>
+              <a:rPr lang="nb-NO" dirty="0"/>
+              <a:t>» – mange former</a:t>
+            </a:r>
+          </a:p>
+          <a:p>
+            <a:pPr marL="285750" indent="-285750">
+              <a:buFont typeface="Arial" panose="020B0604020202020204" pitchFamily="34" charset="0"/>
+              <a:buChar char="•"/>
+            </a:pPr>
+            <a:endParaRPr lang="nb-NO" dirty="0"/>
+          </a:p>
+          <a:p>
+            <a:pPr marL="285750" indent="-285750">
+              <a:buFont typeface="Arial" panose="020B0604020202020204" pitchFamily="34" charset="0"/>
+              <a:buChar char="•"/>
+            </a:pPr>
+            <a:r>
+              <a:rPr lang="nb-NO" dirty="0" err="1"/>
+              <a:t>php</a:t>
+            </a:r>
+            <a:r>
+              <a:rPr lang="nb-NO" dirty="0"/>
+              <a:t> kan jobbe på abstrakte klasser, men endrer form ved </a:t>
+            </a:r>
+            <a:r>
+              <a:rPr lang="nb-NO" dirty="0" err="1"/>
+              <a:t>runtime</a:t>
+            </a:r>
+            <a:endParaRPr lang="nb-NO" dirty="0"/>
+          </a:p>
+        </p:txBody>
+      </p:sp>
+      <p:pic>
+        <p:nvPicPr>
+          <p:cNvPr id="5" name="Bilde 4">
+            <a:extLst>
+              <a:ext uri="{FF2B5EF4-FFF2-40B4-BE49-F238E27FC236}">
+                <a16:creationId xmlns:a16="http://schemas.microsoft.com/office/drawing/2014/main" id="{3AEAB89A-0A1B-4457-BF73-7949F060FC3E}"/>
+              </a:ext>
+            </a:extLst>
+          </p:cNvPr>
+          <p:cNvPicPr>
+            <a:picLocks noChangeAspect="1"/>
+          </p:cNvPicPr>
+          <p:nvPr/>
+        </p:nvPicPr>
+        <p:blipFill>
+          <a:blip r:embed="rId2"/>
+          <a:stretch>
+            <a:fillRect/>
+          </a:stretch>
+        </p:blipFill>
+        <p:spPr>
+          <a:xfrm>
+            <a:off x="5682305" y="0"/>
+            <a:ext cx="6509695" cy="6858000"/>
+          </a:xfrm>
+          <a:prstGeom prst="rect">
+            <a:avLst/>
+          </a:prstGeom>
+        </p:spPr>
+      </p:pic>
     </p:spTree>
     <p:extLst>
       <p:ext uri="{BB962C8B-B14F-4D97-AF65-F5344CB8AC3E}">

</xml_diff>